<commit_message>
finished practices and code for the python
</commit_message>
<xml_diff>
--- a/Bootcamp/OOP/OOP.pptx
+++ b/Bootcamp/OOP/OOP.pptx
@@ -5,7 +5,7 @@
     <p:sldMasterId id="2147483648" r:id="rId4"/>
   </p:sldMasterIdLst>
   <p:notesMasterIdLst>
-    <p:notesMasterId r:id="rId21"/>
+    <p:notesMasterId r:id="rId20"/>
   </p:notesMasterIdLst>
   <p:sldIdLst>
     <p:sldId id="282" r:id="rId5"/>
@@ -18,12 +18,11 @@
     <p:sldId id="397" r:id="rId12"/>
     <p:sldId id="398" r:id="rId13"/>
     <p:sldId id="399" r:id="rId14"/>
-    <p:sldId id="400" r:id="rId15"/>
-    <p:sldId id="401" r:id="rId16"/>
-    <p:sldId id="402" r:id="rId17"/>
-    <p:sldId id="403" r:id="rId18"/>
-    <p:sldId id="404" r:id="rId19"/>
-    <p:sldId id="405" r:id="rId20"/>
+    <p:sldId id="401" r:id="rId15"/>
+    <p:sldId id="402" r:id="rId16"/>
+    <p:sldId id="403" r:id="rId17"/>
+    <p:sldId id="404" r:id="rId18"/>
+    <p:sldId id="405" r:id="rId19"/>
   </p:sldIdLst>
   <p:sldSz cx="12192000" cy="6858000"/>
   <p:notesSz cx="6858000" cy="9144000"/>
@@ -141,7 +140,6 @@
             <p14:sldId id="397"/>
             <p14:sldId id="398"/>
             <p14:sldId id="399"/>
-            <p14:sldId id="400"/>
             <p14:sldId id="401"/>
             <p14:sldId id="402"/>
             <p14:sldId id="403"/>
@@ -251,7 +249,7 @@
           <a:p>
             <a:fld id="{B2A70591-2E3C-5F42-A4E1-C0F5A0F4E5DB}" type="datetimeFigureOut">
               <a:rPr lang="en-US" smtClean="0"/>
-              <a:t>5/18/2025</a:t>
+              <a:t>5/19/2025</a:t>
             </a:fld>
             <a:endParaRPr lang="en-US"/>
           </a:p>
@@ -635,114 +633,6 @@
         <p:cNvPr id="1" name="">
           <a:extLst>
             <a:ext uri="{FF2B5EF4-FFF2-40B4-BE49-F238E27FC236}">
-              <a16:creationId xmlns:a16="http://schemas.microsoft.com/office/drawing/2014/main" id="{F0C85735-5B1B-9A01-CE64-78233B014866}"/>
-            </a:ext>
-          </a:extLst>
-        </p:cNvPr>
-        <p:cNvGrpSpPr/>
-        <p:nvPr/>
-      </p:nvGrpSpPr>
-      <p:grpSpPr>
-        <a:xfrm>
-          <a:off x="0" y="0"/>
-          <a:ext cx="0" cy="0"/>
-          <a:chOff x="0" y="0"/>
-          <a:chExt cx="0" cy="0"/>
-        </a:xfrm>
-      </p:grpSpPr>
-      <p:sp>
-        <p:nvSpPr>
-          <p:cNvPr id="2" name="Slide Image Placeholder 1">
-            <a:extLst>
-              <a:ext uri="{FF2B5EF4-FFF2-40B4-BE49-F238E27FC236}">
-                <a16:creationId xmlns:a16="http://schemas.microsoft.com/office/drawing/2014/main" id="{8395F4E0-527F-C2F4-A537-4D9013BED3B7}"/>
-              </a:ext>
-            </a:extLst>
-          </p:cNvPr>
-          <p:cNvSpPr>
-            <a:spLocks noGrp="1" noRot="1" noChangeAspect="1"/>
-          </p:cNvSpPr>
-          <p:nvPr>
-            <p:ph type="sldImg"/>
-          </p:nvPr>
-        </p:nvSpPr>
-        <p:spPr/>
-      </p:sp>
-      <p:sp>
-        <p:nvSpPr>
-          <p:cNvPr id="3" name="Notes Placeholder 2">
-            <a:extLst>
-              <a:ext uri="{FF2B5EF4-FFF2-40B4-BE49-F238E27FC236}">
-                <a16:creationId xmlns:a16="http://schemas.microsoft.com/office/drawing/2014/main" id="{CD2C6BBF-9D76-4B51-2E7F-85F6E0148A39}"/>
-              </a:ext>
-            </a:extLst>
-          </p:cNvPr>
-          <p:cNvSpPr>
-            <a:spLocks noGrp="1"/>
-          </p:cNvSpPr>
-          <p:nvPr>
-            <p:ph type="body" idx="1"/>
-          </p:nvPr>
-        </p:nvSpPr>
-        <p:spPr/>
-        <p:txBody>
-          <a:bodyPr/>
-          <a:lstStyle/>
-          <a:p>
-            <a:endParaRPr lang="hr-HR" dirty="0"/>
-          </a:p>
-        </p:txBody>
-      </p:sp>
-      <p:sp>
-        <p:nvSpPr>
-          <p:cNvPr id="4" name="Slide Number Placeholder 3">
-            <a:extLst>
-              <a:ext uri="{FF2B5EF4-FFF2-40B4-BE49-F238E27FC236}">
-                <a16:creationId xmlns:a16="http://schemas.microsoft.com/office/drawing/2014/main" id="{48B73491-C83B-9903-C796-D1340400DF67}"/>
-              </a:ext>
-            </a:extLst>
-          </p:cNvPr>
-          <p:cNvSpPr>
-            <a:spLocks noGrp="1"/>
-          </p:cNvSpPr>
-          <p:nvPr>
-            <p:ph type="sldNum" sz="quarter" idx="5"/>
-          </p:nvPr>
-        </p:nvSpPr>
-        <p:spPr/>
-        <p:txBody>
-          <a:bodyPr/>
-          <a:lstStyle/>
-          <a:p>
-            <a:fld id="{343B951A-A665-1949-AEDB-B62DC9BE7F13}" type="slidenum">
-              <a:rPr lang="en-US" smtClean="0"/>
-              <a:t>11</a:t>
-            </a:fld>
-            <a:endParaRPr lang="en-US"/>
-          </a:p>
-        </p:txBody>
-      </p:sp>
-    </p:spTree>
-    <p:extLst>
-      <p:ext uri="{BB962C8B-B14F-4D97-AF65-F5344CB8AC3E}">
-        <p14:creationId xmlns:p14="http://schemas.microsoft.com/office/powerpoint/2010/main" val="3087439549"/>
-      </p:ext>
-    </p:extLst>
-  </p:cSld>
-  <p:clrMapOvr>
-    <a:masterClrMapping/>
-  </p:clrMapOvr>
-</p:notes>
-</file>
-
-<file path=ppt/notesSlides/notesSlide11.xml><?xml version="1.0" encoding="utf-8"?>
-<p:notes xmlns:a="http://schemas.openxmlformats.org/drawingml/2006/main" xmlns:r="http://schemas.openxmlformats.org/officeDocument/2006/relationships" xmlns:p="http://schemas.openxmlformats.org/presentationml/2006/main">
-  <p:cSld>
-    <p:spTree>
-      <p:nvGrpSpPr>
-        <p:cNvPr id="1" name="">
-          <a:extLst>
-            <a:ext uri="{FF2B5EF4-FFF2-40B4-BE49-F238E27FC236}">
               <a16:creationId xmlns:a16="http://schemas.microsoft.com/office/drawing/2014/main" id="{74F49AC6-6096-3FB3-70C5-2F96ED48D669}"/>
             </a:ext>
           </a:extLst>
@@ -824,7 +714,7 @@
           <a:p>
             <a:fld id="{343B951A-A665-1949-AEDB-B62DC9BE7F13}" type="slidenum">
               <a:rPr lang="en-US" smtClean="0"/>
-              <a:t>12</a:t>
+              <a:t>11</a:t>
             </a:fld>
             <a:endParaRPr lang="en-US"/>
           </a:p>
@@ -843,7 +733,7 @@
 </p:notes>
 </file>
 
-<file path=ppt/notesSlides/notesSlide12.xml><?xml version="1.0" encoding="utf-8"?>
+<file path=ppt/notesSlides/notesSlide11.xml><?xml version="1.0" encoding="utf-8"?>
 <p:notes xmlns:a="http://schemas.openxmlformats.org/drawingml/2006/main" xmlns:r="http://schemas.openxmlformats.org/officeDocument/2006/relationships" xmlns:p="http://schemas.openxmlformats.org/presentationml/2006/main">
   <p:cSld>
     <p:spTree>
@@ -932,7 +822,7 @@
           <a:p>
             <a:fld id="{343B951A-A665-1949-AEDB-B62DC9BE7F13}" type="slidenum">
               <a:rPr lang="en-US" smtClean="0"/>
-              <a:t>13</a:t>
+              <a:t>12</a:t>
             </a:fld>
             <a:endParaRPr lang="en-US"/>
           </a:p>
@@ -951,7 +841,7 @@
 </p:notes>
 </file>
 
-<file path=ppt/notesSlides/notesSlide13.xml><?xml version="1.0" encoding="utf-8"?>
+<file path=ppt/notesSlides/notesSlide12.xml><?xml version="1.0" encoding="utf-8"?>
 <p:notes xmlns:a="http://schemas.openxmlformats.org/drawingml/2006/main" xmlns:r="http://schemas.openxmlformats.org/officeDocument/2006/relationships" xmlns:p="http://schemas.openxmlformats.org/presentationml/2006/main">
   <p:cSld>
     <p:spTree>
@@ -1040,7 +930,7 @@
           <a:p>
             <a:fld id="{343B951A-A665-1949-AEDB-B62DC9BE7F13}" type="slidenum">
               <a:rPr lang="en-US" smtClean="0"/>
-              <a:t>14</a:t>
+              <a:t>13</a:t>
             </a:fld>
             <a:endParaRPr lang="en-US"/>
           </a:p>
@@ -1059,7 +949,7 @@
 </p:notes>
 </file>
 
-<file path=ppt/notesSlides/notesSlide14.xml><?xml version="1.0" encoding="utf-8"?>
+<file path=ppt/notesSlides/notesSlide13.xml><?xml version="1.0" encoding="utf-8"?>
 <p:notes xmlns:a="http://schemas.openxmlformats.org/drawingml/2006/main" xmlns:r="http://schemas.openxmlformats.org/officeDocument/2006/relationships" xmlns:p="http://schemas.openxmlformats.org/presentationml/2006/main">
   <p:cSld>
     <p:spTree>
@@ -1148,7 +1038,7 @@
           <a:p>
             <a:fld id="{343B951A-A665-1949-AEDB-B62DC9BE7F13}" type="slidenum">
               <a:rPr lang="en-US" smtClean="0"/>
-              <a:t>15</a:t>
+              <a:t>14</a:t>
             </a:fld>
             <a:endParaRPr lang="en-US"/>
           </a:p>
@@ -1167,7 +1057,7 @@
 </p:notes>
 </file>
 
-<file path=ppt/notesSlides/notesSlide15.xml><?xml version="1.0" encoding="utf-8"?>
+<file path=ppt/notesSlides/notesSlide14.xml><?xml version="1.0" encoding="utf-8"?>
 <p:notes xmlns:a="http://schemas.openxmlformats.org/drawingml/2006/main" xmlns:r="http://schemas.openxmlformats.org/officeDocument/2006/relationships" xmlns:p="http://schemas.openxmlformats.org/presentationml/2006/main">
   <p:cSld>
     <p:spTree>
@@ -1229,7 +1119,10 @@
           <a:bodyPr/>
           <a:lstStyle/>
           <a:p>
-            <a:endParaRPr lang="hr-HR" dirty="0"/>
+            <a:r>
+              <a:rPr lang="hr-HR" dirty="0"/>
+              <a:t>https://docs.google.com/document/d/1SaCeT4RTAKUcJU7cfOFYrXhfP73OO5A3uFuGskYs-Zo/edit?usp=sharing</a:t>
+            </a:r>
           </a:p>
         </p:txBody>
       </p:sp>
@@ -1256,7 +1149,7 @@
           <a:p>
             <a:fld id="{343B951A-A665-1949-AEDB-B62DC9BE7F13}" type="slidenum">
               <a:rPr lang="en-US" smtClean="0"/>
-              <a:t>16</a:t>
+              <a:t>15</a:t>
             </a:fld>
             <a:endParaRPr lang="en-US"/>
           </a:p>
@@ -2834,7 +2727,7 @@
                 <a:ea typeface="Open Sans" panose="020B0606030504020204" pitchFamily="34" charset="0"/>
                 <a:cs typeface="Open Sans" panose="020B0606030504020204" pitchFamily="34" charset="0"/>
               </a:rPr>
-              <a:t>18/05/2025</a:t>
+              <a:t>19/05/2025</a:t>
             </a:fld>
             <a:endParaRPr lang="en-GB" sz="1800" b="0" i="0" kern="1200" dirty="0">
               <a:solidFill>
@@ -3579,7 +3472,7 @@
                 <a:ea typeface="Open Sans" panose="020B0606030504020204" pitchFamily="34" charset="0"/>
                 <a:cs typeface="Open Sans" panose="020B0606030504020204" pitchFamily="34" charset="0"/>
               </a:rPr>
-              <a:t>18/05/2025</a:t>
+              <a:t>19/05/2025</a:t>
             </a:fld>
             <a:endParaRPr lang="en-GB" sz="1800" b="0" i="0" kern="1200" dirty="0">
               <a:solidFill>
@@ -4102,7 +3995,7 @@
                 <a:ea typeface="Open Sans" panose="020B0606030504020204" pitchFamily="34" charset="0"/>
                 <a:cs typeface="Open Sans" panose="020B0606030504020204" pitchFamily="34" charset="0"/>
               </a:rPr>
-              <a:t>18/05/2025</a:t>
+              <a:t>19/05/2025</a:t>
             </a:fld>
             <a:endParaRPr lang="en-GB" sz="1800" b="0" i="0" kern="1200" dirty="0">
               <a:solidFill>
@@ -5068,7 +4961,7 @@
                 <a:ea typeface="Open Sans" panose="020B0606030504020204" pitchFamily="34" charset="0"/>
                 <a:cs typeface="Open Sans" panose="020B0606030504020204" pitchFamily="34" charset="0"/>
               </a:rPr>
-              <a:t>18/05/2025</a:t>
+              <a:t>19/05/2025</a:t>
             </a:fld>
             <a:endParaRPr lang="en-GB" sz="1800" b="0" i="0" kern="1200" dirty="0">
               <a:solidFill>
@@ -5507,7 +5400,7 @@
                 <a:ea typeface="Open Sans" panose="020B0606030504020204" pitchFamily="34" charset="0"/>
                 <a:cs typeface="Open Sans" panose="020B0606030504020204" pitchFamily="34" charset="0"/>
               </a:rPr>
-              <a:t>18/05/2025</a:t>
+              <a:t>19/05/2025</a:t>
             </a:fld>
             <a:endParaRPr lang="en-GB" sz="1800" b="0" i="0" kern="1200" dirty="0">
               <a:solidFill>
@@ -7277,7 +7170,7 @@
                 <a:ea typeface="Open Sans" pitchFamily="2" charset="0"/>
                 <a:cs typeface="Open Sans" pitchFamily="2" charset="0"/>
               </a:rPr>
-              <a:t>18/05/2025</a:t>
+              <a:t>19/05/2025</a:t>
             </a:fld>
             <a:endParaRPr lang="en-GB" sz="1800" b="0" i="0" kern="1200" dirty="0">
               <a:solidFill>
@@ -9027,7 +8920,7 @@
                 <a:ea typeface="Open Sans" pitchFamily="2" charset="0"/>
                 <a:cs typeface="Open Sans" pitchFamily="2" charset="0"/>
               </a:rPr>
-              <a:t>18/05/2025</a:t>
+              <a:t>19/05/2025</a:t>
             </a:fld>
             <a:endParaRPr lang="en-GB" sz="1800" b="0" i="0" kern="1200" dirty="0">
               <a:solidFill>
@@ -9544,7 +9437,7 @@
                 <a:ea typeface="Open Sans" panose="020B0606030504020204" pitchFamily="34" charset="0"/>
                 <a:cs typeface="Open Sans" panose="020B0606030504020204" pitchFamily="34" charset="0"/>
               </a:rPr>
-              <a:t>18/05/2025</a:t>
+              <a:t>19/05/2025</a:t>
             </a:fld>
             <a:endParaRPr lang="en-GB" sz="1800" b="0" i="0" kern="1200" dirty="0">
               <a:solidFill>
@@ -10141,7 +10034,7 @@
                 <a:ea typeface="Open Sans" pitchFamily="2" charset="0"/>
                 <a:cs typeface="Open Sans" pitchFamily="2" charset="0"/>
               </a:rPr>
-              <a:t>18/05/2025</a:t>
+              <a:t>19/05/2025</a:t>
             </a:fld>
             <a:endParaRPr lang="en-GB" sz="1800" b="0" i="0" kern="1200" dirty="0">
               <a:solidFill>
@@ -10681,7 +10574,7 @@
                 <a:ea typeface="Open Sans" panose="020B0606030504020204" pitchFamily="34" charset="0"/>
                 <a:cs typeface="Open Sans" panose="020B0606030504020204" pitchFamily="34" charset="0"/>
               </a:rPr>
-              <a:t>18/05/2025</a:t>
+              <a:t>19/05/2025</a:t>
             </a:fld>
             <a:endParaRPr lang="en-GB" sz="1800" b="0" i="0" kern="1200" dirty="0">
               <a:solidFill>
@@ -11382,7 +11275,7 @@
                 <a:ea typeface="Open Sans" panose="020B0606030504020204" pitchFamily="34" charset="0"/>
                 <a:cs typeface="Open Sans" panose="020B0606030504020204" pitchFamily="34" charset="0"/>
               </a:rPr>
-              <a:t>18/05/2025</a:t>
+              <a:t>19/05/2025</a:t>
             </a:fld>
             <a:endParaRPr lang="en-GB" sz="1800" b="0" i="0" kern="1200" dirty="0">
               <a:solidFill>
@@ -11745,7 +11638,7 @@
                 <a:ea typeface="Open Sans" pitchFamily="2" charset="0"/>
                 <a:cs typeface="Open Sans" pitchFamily="2" charset="0"/>
               </a:rPr>
-              <a:t>18/05/2025</a:t>
+              <a:t>19/05/2025</a:t>
             </a:fld>
             <a:endParaRPr lang="en-GB" sz="1800" b="0" i="0" kern="1200" dirty="0">
               <a:solidFill>
@@ -12140,7 +12033,7 @@
                 <a:ea typeface="Open Sans" pitchFamily="2" charset="0"/>
                 <a:cs typeface="Open Sans" pitchFamily="2" charset="0"/>
               </a:rPr>
-              <a:t>18/05/2025</a:t>
+              <a:t>19/05/2025</a:t>
             </a:fld>
             <a:endParaRPr lang="en-GB" sz="1800" b="0" i="0" kern="1200" dirty="0">
               <a:solidFill>
@@ -12953,8 +12846,8 @@
         </p:nvSpPr>
         <p:spPr>
           <a:xfrm>
-            <a:off x="3203778" y="1391779"/>
-            <a:ext cx="5127309" cy="1561822"/>
+            <a:off x="863194" y="1391779"/>
+            <a:ext cx="10716768" cy="1561822"/>
           </a:xfrm>
           <a:prstGeom prst="rect">
             <a:avLst/>
@@ -12962,7 +12855,7 @@
         </p:spPr>
         <p:txBody>
           <a:bodyPr vert="horz" lIns="91440" tIns="45720" rIns="91440" bIns="45720" rtlCol="0">
-            <a:normAutofit/>
+            <a:noAutofit/>
           </a:bodyPr>
           <a:lstStyle>
             <a:lvl1pPr marL="368300" indent="-352425" algn="l" defTabSz="914400" rtl="0" eaLnBrk="1" latinLnBrk="0" hangingPunct="1">
@@ -13166,7 +13059,7 @@
               <a:buNone/>
             </a:pPr>
             <a:r>
-              <a:rPr lang="hr-HR" sz="1200" b="1" dirty="0"/>
+              <a:rPr lang="hr-HR" sz="1800" b="1" dirty="0"/>
               <a:t>Osnovni Koncepti Nasljeđivanja</a:t>
             </a:r>
           </a:p>
@@ -13175,7 +13068,7 @@
               <a:buNone/>
             </a:pPr>
             <a:r>
-              <a:rPr lang="hr-HR" sz="1200" dirty="0"/>
+              <a:rPr lang="hr-HR" sz="1800" dirty="0"/>
               <a:t>Nasljeđivanje omogućuje stvaranje hijerarhije klasa gdje:</a:t>
             </a:r>
           </a:p>
@@ -13185,23 +13078,23 @@
               <a:buChar char="•"/>
             </a:pPr>
             <a:r>
-              <a:rPr lang="hr-HR" sz="1200" b="1" dirty="0" err="1"/>
+              <a:rPr lang="hr-HR" sz="1800" b="1" dirty="0" err="1"/>
               <a:t>Parent</a:t>
             </a:r>
             <a:r>
-              <a:rPr lang="hr-HR" sz="1200" b="1" dirty="0"/>
+              <a:rPr lang="hr-HR" sz="1800" b="1" dirty="0"/>
               <a:t> (roditeljska) klasa:</a:t>
             </a:r>
             <a:r>
-              <a:rPr lang="hr-HR" sz="1200" dirty="0"/>
+              <a:rPr lang="hr-HR" sz="1800" dirty="0"/>
               <a:t> Sadrži zajedničke metode i svojstva (npr. </a:t>
             </a:r>
             <a:r>
-              <a:rPr lang="hr-HR" sz="1200" i="1" dirty="0" err="1"/>
+              <a:rPr lang="hr-HR" sz="1800" i="1" dirty="0" err="1"/>
               <a:t>Device</a:t>
             </a:r>
             <a:r>
-              <a:rPr lang="hr-HR" sz="1200" dirty="0"/>
+              <a:rPr lang="hr-HR" sz="1800" dirty="0"/>
               <a:t>).</a:t>
             </a:r>
           </a:p>
@@ -13211,23 +13104,23 @@
               <a:buChar char="•"/>
             </a:pPr>
             <a:r>
-              <a:rPr lang="hr-HR" sz="1200" b="1" dirty="0" err="1"/>
+              <a:rPr lang="hr-HR" sz="1800" b="1" dirty="0" err="1"/>
               <a:t>Child</a:t>
             </a:r>
             <a:r>
-              <a:rPr lang="hr-HR" sz="1200" b="1" dirty="0"/>
+              <a:rPr lang="hr-HR" sz="1800" b="1" dirty="0"/>
               <a:t> (djeca) klasa:</a:t>
             </a:r>
             <a:r>
-              <a:rPr lang="hr-HR" sz="1200" dirty="0"/>
+              <a:rPr lang="hr-HR" sz="1800" dirty="0"/>
               <a:t> Nasljeđuje i proširuje funkcionalnost roditeljske klase (npr. </a:t>
             </a:r>
             <a:r>
-              <a:rPr lang="hr-HR" sz="1200" i="1" dirty="0"/>
+              <a:rPr lang="hr-HR" sz="1800" i="1" dirty="0"/>
               <a:t>Printer</a:t>
             </a:r>
             <a:r>
-              <a:rPr lang="hr-HR" sz="1200" dirty="0"/>
+              <a:rPr lang="hr-HR" sz="1800" dirty="0"/>
               <a:t>).</a:t>
             </a:r>
           </a:p>
@@ -13255,8 +13148,8 @@
         </p:blipFill>
         <p:spPr>
           <a:xfrm>
-            <a:off x="3203778" y="3595012"/>
-            <a:ext cx="5784444" cy="1871209"/>
+            <a:off x="2226119" y="3108348"/>
+            <a:ext cx="7739761" cy="2503734"/>
           </a:xfrm>
           <a:prstGeom prst="rect">
             <a:avLst/>
@@ -13277,435 +13170,6 @@
 </file>
 
 <file path=ppt/slides/slide11.xml><?xml version="1.0" encoding="utf-8"?>
-<p:sld xmlns:a="http://schemas.openxmlformats.org/drawingml/2006/main" xmlns:r="http://schemas.openxmlformats.org/officeDocument/2006/relationships" xmlns:p="http://schemas.openxmlformats.org/presentationml/2006/main">
-  <p:cSld>
-    <p:spTree>
-      <p:nvGrpSpPr>
-        <p:cNvPr id="1" name="">
-          <a:extLst>
-            <a:ext uri="{FF2B5EF4-FFF2-40B4-BE49-F238E27FC236}">
-              <a16:creationId xmlns:a16="http://schemas.microsoft.com/office/drawing/2014/main" id="{FED7CE5B-18BB-5BD2-6196-9F01110E239E}"/>
-            </a:ext>
-          </a:extLst>
-        </p:cNvPr>
-        <p:cNvGrpSpPr/>
-        <p:nvPr/>
-      </p:nvGrpSpPr>
-      <p:grpSpPr>
-        <a:xfrm>
-          <a:off x="0" y="0"/>
-          <a:ext cx="0" cy="0"/>
-          <a:chOff x="0" y="0"/>
-          <a:chExt cx="0" cy="0"/>
-        </a:xfrm>
-      </p:grpSpPr>
-      <p:sp>
-        <p:nvSpPr>
-          <p:cNvPr id="4" name="Title 1">
-            <a:extLst>
-              <a:ext uri="{FF2B5EF4-FFF2-40B4-BE49-F238E27FC236}">
-                <a16:creationId xmlns:a16="http://schemas.microsoft.com/office/drawing/2014/main" id="{16386B9E-947A-A306-F73B-3688C72C16AF}"/>
-              </a:ext>
-            </a:extLst>
-          </p:cNvPr>
-          <p:cNvSpPr txBox="1">
-            <a:spLocks/>
-          </p:cNvSpPr>
-          <p:nvPr/>
-        </p:nvSpPr>
-        <p:spPr>
-          <a:xfrm>
-            <a:off x="990600" y="383056"/>
-            <a:ext cx="10515600" cy="853976"/>
-          </a:xfrm>
-          <a:prstGeom prst="rect">
-            <a:avLst/>
-          </a:prstGeom>
-        </p:spPr>
-        <p:txBody>
-          <a:bodyPr vert="horz" lIns="91440" tIns="45720" rIns="91440" bIns="45720" rtlCol="0" anchor="ctr">
-            <a:normAutofit/>
-          </a:bodyPr>
-          <a:lstStyle>
-            <a:lvl1pPr algn="l" defTabSz="914400" rtl="0" eaLnBrk="1" latinLnBrk="0" hangingPunct="1">
-              <a:lnSpc>
-                <a:spcPct val="90000"/>
-              </a:lnSpc>
-              <a:spcBef>
-                <a:spcPct val="0"/>
-              </a:spcBef>
-              <a:buNone/>
-              <a:defRPr sz="3600" b="1" i="0" kern="1200" cap="all" baseline="0">
-                <a:solidFill>
-                  <a:schemeClr val="tx2"/>
-                </a:solidFill>
-                <a:latin typeface="+mj-lt"/>
-                <a:ea typeface="Open Sans Semibold" panose="020B0606030504020204" pitchFamily="34" charset="0"/>
-                <a:cs typeface="Open Sans Semibold" panose="020B0606030504020204" pitchFamily="34" charset="0"/>
-              </a:defRPr>
-            </a:lvl1pPr>
-          </a:lstStyle>
-          <a:p>
-            <a:r>
-              <a:rPr lang="en-US" dirty="0"/>
-              <a:t>OOP-</a:t>
-            </a:r>
-            <a:r>
-              <a:rPr lang="en-US" dirty="0" err="1"/>
-              <a:t>Naslje</a:t>
-            </a:r>
-            <a:r>
-              <a:rPr lang="hr-HR" dirty="0"/>
-              <a:t>đ</a:t>
-            </a:r>
-            <a:r>
-              <a:rPr lang="en-US" dirty="0" err="1"/>
-              <a:t>ivanje</a:t>
-            </a:r>
-            <a:endParaRPr lang="hr-HR" dirty="0"/>
-          </a:p>
-        </p:txBody>
-      </p:sp>
-      <p:sp>
-        <p:nvSpPr>
-          <p:cNvPr id="2" name="Content Placeholder 2">
-            <a:extLst>
-              <a:ext uri="{FF2B5EF4-FFF2-40B4-BE49-F238E27FC236}">
-                <a16:creationId xmlns:a16="http://schemas.microsoft.com/office/drawing/2014/main" id="{26CB13D7-7703-CAA5-968A-BE54EAF225CB}"/>
-              </a:ext>
-            </a:extLst>
-          </p:cNvPr>
-          <p:cNvSpPr txBox="1">
-            <a:spLocks/>
-          </p:cNvSpPr>
-          <p:nvPr/>
-        </p:nvSpPr>
-        <p:spPr>
-          <a:xfrm>
-            <a:off x="3203778" y="1391779"/>
-            <a:ext cx="5127309" cy="1561822"/>
-          </a:xfrm>
-          <a:prstGeom prst="rect">
-            <a:avLst/>
-          </a:prstGeom>
-        </p:spPr>
-        <p:txBody>
-          <a:bodyPr vert="horz" lIns="91440" tIns="45720" rIns="91440" bIns="45720" rtlCol="0">
-            <a:normAutofit/>
-          </a:bodyPr>
-          <a:lstStyle>
-            <a:lvl1pPr marL="368300" indent="-352425" algn="l" defTabSz="914400" rtl="0" eaLnBrk="1" latinLnBrk="0" hangingPunct="1">
-              <a:lnSpc>
-                <a:spcPct val="90000"/>
-              </a:lnSpc>
-              <a:spcBef>
-                <a:spcPts val="600"/>
-              </a:spcBef>
-              <a:spcAft>
-                <a:spcPts val="600"/>
-              </a:spcAft>
-              <a:buClr>
-                <a:schemeClr val="accent2"/>
-              </a:buClr>
-              <a:buFont typeface="Wingdings" pitchFamily="2" charset="2"/>
-              <a:buChar char="§"/>
-              <a:tabLst/>
-              <a:defRPr sz="2400" kern="1200">
-                <a:solidFill>
-                  <a:schemeClr val="tx1"/>
-                </a:solidFill>
-                <a:latin typeface="+mn-lt"/>
-                <a:ea typeface="Open Sans" panose="020B0606030504020204" pitchFamily="34" charset="0"/>
-                <a:cs typeface="Open Sans" panose="020B0606030504020204" pitchFamily="34" charset="0"/>
-              </a:defRPr>
-            </a:lvl1pPr>
-            <a:lvl2pPr marL="771525" indent="-274638" algn="l" defTabSz="914400" rtl="0" eaLnBrk="1" latinLnBrk="0" hangingPunct="1">
-              <a:lnSpc>
-                <a:spcPct val="90000"/>
-              </a:lnSpc>
-              <a:spcBef>
-                <a:spcPts val="600"/>
-              </a:spcBef>
-              <a:spcAft>
-                <a:spcPts val="600"/>
-              </a:spcAft>
-              <a:buClr>
-                <a:schemeClr val="accent2"/>
-              </a:buClr>
-              <a:buFont typeface="Wingdings" pitchFamily="2" charset="2"/>
-              <a:buChar char="§"/>
-              <a:tabLst/>
-              <a:defRPr sz="2200" kern="1200">
-                <a:solidFill>
-                  <a:schemeClr val="tx1"/>
-                </a:solidFill>
-                <a:latin typeface="+mn-lt"/>
-                <a:ea typeface="Open Sans" panose="020B0606030504020204" pitchFamily="34" charset="0"/>
-                <a:cs typeface="Open Sans" panose="020B0606030504020204" pitchFamily="34" charset="0"/>
-              </a:defRPr>
-            </a:lvl2pPr>
-            <a:lvl3pPr marL="1143000" indent="-228600" algn="l" defTabSz="914400" rtl="0" eaLnBrk="1" latinLnBrk="0" hangingPunct="1">
-              <a:lnSpc>
-                <a:spcPct val="90000"/>
-              </a:lnSpc>
-              <a:spcBef>
-                <a:spcPts val="600"/>
-              </a:spcBef>
-              <a:spcAft>
-                <a:spcPts val="600"/>
-              </a:spcAft>
-              <a:buClr>
-                <a:schemeClr val="accent2"/>
-              </a:buClr>
-              <a:buFont typeface="Wingdings" pitchFamily="2" charset="2"/>
-              <a:buChar char="§"/>
-              <a:defRPr sz="2000" kern="1200">
-                <a:solidFill>
-                  <a:schemeClr val="tx1"/>
-                </a:solidFill>
-                <a:latin typeface="+mn-lt"/>
-                <a:ea typeface="Open Sans" panose="020B0606030504020204" pitchFamily="34" charset="0"/>
-                <a:cs typeface="Open Sans" panose="020B0606030504020204" pitchFamily="34" charset="0"/>
-              </a:defRPr>
-            </a:lvl3pPr>
-            <a:lvl4pPr marL="1600200" indent="-228600" algn="l" defTabSz="914400" rtl="0" eaLnBrk="1" latinLnBrk="0" hangingPunct="1">
-              <a:lnSpc>
-                <a:spcPct val="90000"/>
-              </a:lnSpc>
-              <a:spcBef>
-                <a:spcPts val="600"/>
-              </a:spcBef>
-              <a:spcAft>
-                <a:spcPts val="600"/>
-              </a:spcAft>
-              <a:buClr>
-                <a:schemeClr val="accent2"/>
-              </a:buClr>
-              <a:buFont typeface="Wingdings" pitchFamily="2" charset="2"/>
-              <a:buChar char="§"/>
-              <a:defRPr sz="1800" kern="1200">
-                <a:solidFill>
-                  <a:schemeClr val="tx1"/>
-                </a:solidFill>
-                <a:latin typeface="+mn-lt"/>
-                <a:ea typeface="Open Sans" panose="020B0606030504020204" pitchFamily="34" charset="0"/>
-                <a:cs typeface="Open Sans" panose="020B0606030504020204" pitchFamily="34" charset="0"/>
-              </a:defRPr>
-            </a:lvl4pPr>
-            <a:lvl5pPr marL="1960563" indent="-225425" algn="l" defTabSz="914400" rtl="0" eaLnBrk="1" latinLnBrk="0" hangingPunct="1">
-              <a:lnSpc>
-                <a:spcPct val="90000"/>
-              </a:lnSpc>
-              <a:spcBef>
-                <a:spcPts val="600"/>
-              </a:spcBef>
-              <a:spcAft>
-                <a:spcPts val="600"/>
-              </a:spcAft>
-              <a:buClr>
-                <a:schemeClr val="accent2"/>
-              </a:buClr>
-              <a:buFont typeface="Wingdings" pitchFamily="2" charset="2"/>
-              <a:buChar char="§"/>
-              <a:tabLst/>
-              <a:defRPr sz="1600" kern="1200">
-                <a:solidFill>
-                  <a:schemeClr val="tx1"/>
-                </a:solidFill>
-                <a:latin typeface="+mn-lt"/>
-                <a:ea typeface="Open Sans" panose="020B0606030504020204" pitchFamily="34" charset="0"/>
-                <a:cs typeface="Open Sans" panose="020B0606030504020204" pitchFamily="34" charset="0"/>
-              </a:defRPr>
-            </a:lvl5pPr>
-            <a:lvl6pPr marL="2514600" indent="-228600" algn="l" defTabSz="914400" rtl="0" eaLnBrk="1" latinLnBrk="0" hangingPunct="1">
-              <a:lnSpc>
-                <a:spcPct val="90000"/>
-              </a:lnSpc>
-              <a:spcBef>
-                <a:spcPts val="500"/>
-              </a:spcBef>
-              <a:buFont typeface="Arial" panose="020B0604020202020204" pitchFamily="34" charset="0"/>
-              <a:buChar char="•"/>
-              <a:defRPr sz="1800" kern="1200">
-                <a:solidFill>
-                  <a:schemeClr val="tx1"/>
-                </a:solidFill>
-                <a:latin typeface="+mn-lt"/>
-                <a:ea typeface="+mn-ea"/>
-                <a:cs typeface="+mn-cs"/>
-              </a:defRPr>
-            </a:lvl6pPr>
-            <a:lvl7pPr marL="2971800" indent="-228600" algn="l" defTabSz="914400" rtl="0" eaLnBrk="1" latinLnBrk="0" hangingPunct="1">
-              <a:lnSpc>
-                <a:spcPct val="90000"/>
-              </a:lnSpc>
-              <a:spcBef>
-                <a:spcPts val="500"/>
-              </a:spcBef>
-              <a:buFont typeface="Arial" panose="020B0604020202020204" pitchFamily="34" charset="0"/>
-              <a:buChar char="•"/>
-              <a:defRPr sz="1800" kern="1200">
-                <a:solidFill>
-                  <a:schemeClr val="tx1"/>
-                </a:solidFill>
-                <a:latin typeface="+mn-lt"/>
-                <a:ea typeface="+mn-ea"/>
-                <a:cs typeface="+mn-cs"/>
-              </a:defRPr>
-            </a:lvl7pPr>
-            <a:lvl8pPr marL="3429000" indent="-228600" algn="l" defTabSz="914400" rtl="0" eaLnBrk="1" latinLnBrk="0" hangingPunct="1">
-              <a:lnSpc>
-                <a:spcPct val="90000"/>
-              </a:lnSpc>
-              <a:spcBef>
-                <a:spcPts val="500"/>
-              </a:spcBef>
-              <a:buFont typeface="Arial" panose="020B0604020202020204" pitchFamily="34" charset="0"/>
-              <a:buChar char="•"/>
-              <a:defRPr sz="1800" kern="1200">
-                <a:solidFill>
-                  <a:schemeClr val="tx1"/>
-                </a:solidFill>
-                <a:latin typeface="+mn-lt"/>
-                <a:ea typeface="+mn-ea"/>
-                <a:cs typeface="+mn-cs"/>
-              </a:defRPr>
-            </a:lvl8pPr>
-            <a:lvl9pPr marL="3886200" indent="-228600" algn="l" defTabSz="914400" rtl="0" eaLnBrk="1" latinLnBrk="0" hangingPunct="1">
-              <a:lnSpc>
-                <a:spcPct val="90000"/>
-              </a:lnSpc>
-              <a:spcBef>
-                <a:spcPts val="500"/>
-              </a:spcBef>
-              <a:buFont typeface="Arial" panose="020B0604020202020204" pitchFamily="34" charset="0"/>
-              <a:buChar char="•"/>
-              <a:defRPr sz="1800" kern="1200">
-                <a:solidFill>
-                  <a:schemeClr val="tx1"/>
-                </a:solidFill>
-                <a:latin typeface="+mn-lt"/>
-                <a:ea typeface="+mn-ea"/>
-                <a:cs typeface="+mn-cs"/>
-              </a:defRPr>
-            </a:lvl9pPr>
-          </a:lstStyle>
-          <a:p>
-            <a:pPr>
-              <a:buNone/>
-            </a:pPr>
-            <a:r>
-              <a:rPr lang="hr-HR" sz="1200" b="1" dirty="0"/>
-              <a:t>Osnovni Koncepti Nasljeđivanja</a:t>
-            </a:r>
-          </a:p>
-          <a:p>
-            <a:pPr>
-              <a:buNone/>
-            </a:pPr>
-            <a:r>
-              <a:rPr lang="hr-HR" sz="1200" dirty="0"/>
-              <a:t>Nasljeđivanje omogućuje stvaranje hijerarhije klasa gdje:</a:t>
-            </a:r>
-          </a:p>
-          <a:p>
-            <a:pPr>
-              <a:buFont typeface="Arial" panose="020B0604020202020204" pitchFamily="34" charset="0"/>
-              <a:buChar char="•"/>
-            </a:pPr>
-            <a:r>
-              <a:rPr lang="hr-HR" sz="1200" b="1" dirty="0" err="1"/>
-              <a:t>Parent</a:t>
-            </a:r>
-            <a:r>
-              <a:rPr lang="hr-HR" sz="1200" b="1" dirty="0"/>
-              <a:t> (roditeljska) klasa:</a:t>
-            </a:r>
-            <a:r>
-              <a:rPr lang="hr-HR" sz="1200" dirty="0"/>
-              <a:t> Sadrži zajedničke metode i svojstva (npr. </a:t>
-            </a:r>
-            <a:r>
-              <a:rPr lang="hr-HR" sz="1200" i="1" dirty="0" err="1"/>
-              <a:t>Device</a:t>
-            </a:r>
-            <a:r>
-              <a:rPr lang="hr-HR" sz="1200" dirty="0"/>
-              <a:t>).</a:t>
-            </a:r>
-          </a:p>
-          <a:p>
-            <a:pPr>
-              <a:buFont typeface="Arial" panose="020B0604020202020204" pitchFamily="34" charset="0"/>
-              <a:buChar char="•"/>
-            </a:pPr>
-            <a:r>
-              <a:rPr lang="hr-HR" sz="1200" b="1" dirty="0" err="1"/>
-              <a:t>Child</a:t>
-            </a:r>
-            <a:r>
-              <a:rPr lang="hr-HR" sz="1200" b="1" dirty="0"/>
-              <a:t> (djeca) klasa:</a:t>
-            </a:r>
-            <a:r>
-              <a:rPr lang="hr-HR" sz="1200" dirty="0"/>
-              <a:t> Nasljeđuje i proširuje funkcionalnost roditeljske klase (npr. </a:t>
-            </a:r>
-            <a:r>
-              <a:rPr lang="hr-HR" sz="1200" i="1" dirty="0"/>
-              <a:t>Printer</a:t>
-            </a:r>
-            <a:r>
-              <a:rPr lang="hr-HR" sz="1200" dirty="0"/>
-              <a:t>).</a:t>
-            </a:r>
-          </a:p>
-        </p:txBody>
-      </p:sp>
-      <p:pic>
-        <p:nvPicPr>
-          <p:cNvPr id="5" name="Picture 4">
-            <a:extLst>
-              <a:ext uri="{FF2B5EF4-FFF2-40B4-BE49-F238E27FC236}">
-                <a16:creationId xmlns:a16="http://schemas.microsoft.com/office/drawing/2014/main" id="{A8EDA730-6611-5A23-6E42-F66041775429}"/>
-              </a:ext>
-            </a:extLst>
-          </p:cNvPr>
-          <p:cNvPicPr>
-            <a:picLocks noChangeAspect="1"/>
-          </p:cNvPicPr>
-          <p:nvPr/>
-        </p:nvPicPr>
-        <p:blipFill>
-          <a:blip r:embed="rId3"/>
-          <a:stretch>
-            <a:fillRect/>
-          </a:stretch>
-        </p:blipFill>
-        <p:spPr>
-          <a:xfrm>
-            <a:off x="3203778" y="3595012"/>
-            <a:ext cx="5784444" cy="1871209"/>
-          </a:xfrm>
-          <a:prstGeom prst="rect">
-            <a:avLst/>
-          </a:prstGeom>
-        </p:spPr>
-      </p:pic>
-    </p:spTree>
-    <p:extLst>
-      <p:ext uri="{BB962C8B-B14F-4D97-AF65-F5344CB8AC3E}">
-        <p14:creationId xmlns:p14="http://schemas.microsoft.com/office/powerpoint/2010/main" val="2931834585"/>
-      </p:ext>
-    </p:extLst>
-  </p:cSld>
-  <p:clrMapOvr>
-    <a:masterClrMapping/>
-  </p:clrMapOvr>
-</p:sld>
-</file>
-
-<file path=ppt/slides/slide12.xml><?xml version="1.0" encoding="utf-8"?>
 <p:sld xmlns:a="http://schemas.openxmlformats.org/drawingml/2006/main" xmlns:r="http://schemas.openxmlformats.org/officeDocument/2006/relationships" xmlns:p="http://schemas.openxmlformats.org/presentationml/2006/main">
   <p:cSld>
     <p:spTree>
@@ -13928,7 +13392,7 @@
 </p:sld>
 </file>
 
-<file path=ppt/slides/slide13.xml><?xml version="1.0" encoding="utf-8"?>
+<file path=ppt/slides/slide12.xml><?xml version="1.0" encoding="utf-8"?>
 <p:sld xmlns:a="http://schemas.openxmlformats.org/drawingml/2006/main" xmlns:r="http://schemas.openxmlformats.org/officeDocument/2006/relationships" xmlns:p="http://schemas.openxmlformats.org/presentationml/2006/main">
   <p:cSld>
     <p:spTree>
@@ -14022,8 +13486,8 @@
         </p:nvSpPr>
         <p:spPr>
           <a:xfrm>
-            <a:off x="3203778" y="1391779"/>
-            <a:ext cx="5127309" cy="1027128"/>
+            <a:off x="1119226" y="1009498"/>
+            <a:ext cx="9348825" cy="1409409"/>
           </a:xfrm>
           <a:prstGeom prst="rect">
             <a:avLst/>
@@ -14031,7 +13495,7 @@
         </p:spPr>
         <p:txBody>
           <a:bodyPr vert="horz" lIns="91440" tIns="45720" rIns="91440" bIns="45720" rtlCol="0">
-            <a:normAutofit/>
+            <a:noAutofit/>
           </a:bodyPr>
           <a:lstStyle>
             <a:lvl1pPr marL="368300" indent="-352425" algn="l" defTabSz="914400" rtl="0" eaLnBrk="1" latinLnBrk="0" hangingPunct="1">
@@ -14235,10 +13699,10 @@
               <a:buNone/>
             </a:pPr>
             <a:r>
-              <a:rPr lang="hr-HR" sz="1050" b="1" dirty="0"/>
+              <a:rPr lang="hr-HR" sz="2000" b="1" dirty="0"/>
               <a:t>Kompozicija:</a:t>
             </a:r>
-            <a:endParaRPr lang="hr-HR" sz="1050" dirty="0"/>
+            <a:endParaRPr lang="hr-HR" sz="2000" dirty="0"/>
           </a:p>
           <a:p>
             <a:pPr>
@@ -14246,7 +13710,7 @@
               <a:buChar char="•"/>
             </a:pPr>
             <a:r>
-              <a:rPr lang="hr-HR" sz="1050" dirty="0"/>
+              <a:rPr lang="hr-HR" sz="2000" dirty="0"/>
               <a:t>Umjesto da jedna klasa nasljeđuje drugu, koristi se unutar sebe.</a:t>
             </a:r>
           </a:p>
@@ -14256,9 +13720,61 @@
               <a:buChar char="•"/>
             </a:pPr>
             <a:r>
-              <a:rPr lang="hr-HR" sz="1050" dirty="0"/>
+              <a:rPr lang="hr-HR" sz="2000" dirty="0"/>
               <a:t>Rezultat je jednostavniji, fleksibilniji dizajn bez nepotrebnog preklapanja funkcionalnosti.</a:t>
             </a:r>
+            <a:endParaRPr lang="en-US" sz="2000" dirty="0"/>
+          </a:p>
+          <a:p>
+            <a:pPr>
+              <a:buFont typeface="Arial" panose="020B0604020202020204" pitchFamily="34" charset="0"/>
+              <a:buChar char="•"/>
+            </a:pPr>
+            <a:r>
+              <a:rPr lang="en-US" sz="2000" dirty="0" err="1"/>
+              <a:t>Kompozicija</a:t>
+            </a:r>
+            <a:r>
+              <a:rPr lang="en-US" sz="2000" dirty="0"/>
+              <a:t> se </a:t>
+            </a:r>
+            <a:r>
+              <a:rPr lang="en-US" sz="2000" dirty="0" err="1"/>
+              <a:t>puno</a:t>
+            </a:r>
+            <a:r>
+              <a:rPr lang="en-US" sz="2000" dirty="0"/>
+              <a:t> vise </a:t>
+            </a:r>
+            <a:r>
+              <a:rPr lang="en-US" sz="2000" dirty="0" err="1"/>
+              <a:t>koristi</a:t>
+            </a:r>
+            <a:r>
+              <a:rPr lang="en-US" sz="2000" dirty="0"/>
+              <a:t> </a:t>
+            </a:r>
+            <a:r>
+              <a:rPr lang="en-US" sz="2000" dirty="0" err="1"/>
+              <a:t>nego</a:t>
+            </a:r>
+            <a:r>
+              <a:rPr lang="en-US" sz="2000" dirty="0"/>
+              <a:t> </a:t>
+            </a:r>
+            <a:r>
+              <a:rPr lang="en-US" sz="2000" dirty="0" err="1"/>
+              <a:t>nasljedivanje</a:t>
+            </a:r>
+            <a:r>
+              <a:rPr lang="en-US" sz="2000" dirty="0"/>
+              <a:t> u </a:t>
+            </a:r>
+            <a:r>
+              <a:rPr lang="en-US" sz="2000" dirty="0" err="1"/>
+              <a:t>pythonu</a:t>
+            </a:r>
+            <a:endParaRPr lang="hr-HR" sz="2000" dirty="0"/>
           </a:p>
         </p:txBody>
       </p:sp>
@@ -14284,8 +13800,8 @@
         </p:blipFill>
         <p:spPr>
           <a:xfrm>
-            <a:off x="1036001" y="2952716"/>
-            <a:ext cx="4335554" cy="2260636"/>
+            <a:off x="990600" y="2990967"/>
+            <a:ext cx="4991724" cy="2602775"/>
           </a:xfrm>
           <a:prstGeom prst="rect">
             <a:avLst/>
@@ -14314,8 +13830,8 @@
         </p:blipFill>
         <p:spPr>
           <a:xfrm>
-            <a:off x="7041855" y="3040912"/>
-            <a:ext cx="3745827" cy="2086750"/>
+            <a:off x="6771192" y="3186690"/>
+            <a:ext cx="4091879" cy="2279531"/>
           </a:xfrm>
           <a:prstGeom prst="rect">
             <a:avLst/>
@@ -14335,7 +13851,7 @@
 </p:sld>
 </file>
 
-<file path=ppt/slides/slide14.xml><?xml version="1.0" encoding="utf-8"?>
+<file path=ppt/slides/slide13.xml><?xml version="1.0" encoding="utf-8"?>
 <p:sld xmlns:a="http://schemas.openxmlformats.org/drawingml/2006/main" xmlns:r="http://schemas.openxmlformats.org/officeDocument/2006/relationships" xmlns:p="http://schemas.openxmlformats.org/presentationml/2006/main">
   <p:cSld>
     <p:spTree>
@@ -14429,8 +13945,8 @@
         </p:nvSpPr>
         <p:spPr>
           <a:xfrm>
-            <a:off x="3655661" y="1358795"/>
-            <a:ext cx="4335555" cy="252869"/>
+            <a:off x="990600" y="1254243"/>
+            <a:ext cx="10947805" cy="684285"/>
           </a:xfrm>
           <a:prstGeom prst="rect">
             <a:avLst/>
@@ -14438,7 +13954,7 @@
         </p:spPr>
         <p:txBody>
           <a:bodyPr vert="horz" lIns="91440" tIns="45720" rIns="91440" bIns="45720" rtlCol="0">
-            <a:normAutofit/>
+            <a:noAutofit/>
           </a:bodyPr>
           <a:lstStyle>
             <a:lvl1pPr marL="368300" indent="-352425" algn="l" defTabSz="914400" rtl="0" eaLnBrk="1" latinLnBrk="0" hangingPunct="1">
@@ -14642,18 +14158,17 @@
               <a:buNone/>
             </a:pPr>
             <a:r>
-              <a:rPr lang="en-US" sz="900" dirty="0"/>
+              <a:rPr lang="en-US" sz="2000" dirty="0"/>
               <a:t>O</a:t>
             </a:r>
             <a:r>
-              <a:rPr lang="hr-HR" sz="900" dirty="0" err="1"/>
+              <a:rPr lang="hr-HR" sz="2000" dirty="0" err="1"/>
               <a:t>mogućava</a:t>
             </a:r>
             <a:r>
-              <a:rPr lang="hr-HR" sz="900" dirty="0"/>
+              <a:rPr lang="hr-HR" sz="2000" dirty="0"/>
               <a:t> različitim objektima da implementiraju istu metodu na svoj način</a:t>
             </a:r>
-            <a:endParaRPr lang="hr-HR" sz="1050" dirty="0"/>
           </a:p>
         </p:txBody>
       </p:sp>
@@ -14790,7 +14305,7 @@
 </p:sld>
 </file>
 
-<file path=ppt/slides/slide15.xml><?xml version="1.0" encoding="utf-8"?>
+<file path=ppt/slides/slide14.xml><?xml version="1.0" encoding="utf-8"?>
 <p:sld xmlns:a="http://schemas.openxmlformats.org/drawingml/2006/main" xmlns:r="http://schemas.openxmlformats.org/officeDocument/2006/relationships" xmlns:p="http://schemas.openxmlformats.org/presentationml/2006/main">
   <p:cSld>
     <p:spTree>
@@ -14829,7 +14344,12 @@
             <p:ph type="title"/>
           </p:nvPr>
         </p:nvSpPr>
-        <p:spPr/>
+        <p:spPr>
+          <a:xfrm>
+            <a:off x="715430" y="-556083"/>
+            <a:ext cx="3932237" cy="1433464"/>
+          </a:xfrm>
+        </p:spPr>
         <p:txBody>
           <a:bodyPr/>
           <a:lstStyle/>
@@ -14868,13 +14388,13 @@
         </p:nvSpPr>
         <p:spPr>
           <a:xfrm>
-            <a:off x="839788" y="2708920"/>
-            <a:ext cx="3932237" cy="3798206"/>
+            <a:off x="182880" y="1053389"/>
+            <a:ext cx="4589145" cy="5453737"/>
           </a:xfrm>
         </p:spPr>
         <p:txBody>
           <a:bodyPr>
-            <a:normAutofit fontScale="62500" lnSpcReduction="20000"/>
+            <a:normAutofit fontScale="92500" lnSpcReduction="20000"/>
           </a:bodyPr>
           <a:lstStyle/>
           <a:p>
@@ -15135,8 +14655,8 @@
         </p:blipFill>
         <p:spPr>
           <a:xfrm>
-            <a:off x="6423837" y="2753168"/>
-            <a:ext cx="4724400" cy="2457450"/>
+            <a:off x="5926403" y="2201875"/>
+            <a:ext cx="5784250" cy="3008743"/>
           </a:xfrm>
           <a:prstGeom prst="rect">
             <a:avLst/>
@@ -15156,7 +14676,7 @@
 </p:sld>
 </file>
 
-<file path=ppt/slides/slide16.xml><?xml version="1.0" encoding="utf-8"?>
+<file path=ppt/slides/slide15.xml><?xml version="1.0" encoding="utf-8"?>
 <p:sld xmlns:a="http://schemas.openxmlformats.org/drawingml/2006/main" xmlns:r="http://schemas.openxmlformats.org/officeDocument/2006/relationships" xmlns:p="http://schemas.openxmlformats.org/presentationml/2006/main">
   <p:cSld>
     <p:spTree>
@@ -15263,129 +14783,13 @@
             </a:pPr>
             <a:r>
               <a:rPr lang="hr-HR" sz="1100" dirty="0"/>
-              <a:t>Planirajte i implementirajte malu aplikaciju za upravljanje knjižnicom. Aplikacija treba omogućiti vođenje evidencije o knjigama, članovima knjižnice i rezervacijama. Potrebno je definirati sljedeće klase i njihove odnose:</a:t>
-            </a:r>
-          </a:p>
-          <a:p>
-            <a:r>
-              <a:rPr lang="hr-HR" sz="1100" b="1" dirty="0"/>
-              <a:t>Klasa </a:t>
-            </a:r>
-            <a:r>
-              <a:rPr lang="hr-HR" sz="1100" b="1" dirty="0" err="1"/>
-              <a:t>Book</a:t>
-            </a:r>
-            <a:r>
-              <a:rPr lang="hr-HR" sz="1100" b="1" dirty="0"/>
-              <a:t> (Knjiga):</a:t>
-            </a:r>
-            <a:endParaRPr lang="hr-HR" sz="1100" dirty="0"/>
-          </a:p>
-          <a:p>
-            <a:pPr marL="742950" lvl="1" indent="-285750">
-              <a:buFont typeface="+mj-lt"/>
-              <a:buAutoNum type="arabicPeriod"/>
-            </a:pPr>
-            <a:r>
-              <a:rPr lang="hr-HR" sz="1100" dirty="0">
-                <a:solidFill>
-                  <a:schemeClr val="bg1"/>
-                </a:solidFill>
-              </a:rPr>
-              <a:t>Sadrži informacije o knjizi (npr. naslov, autor, jedinstveni ID, status dostupnosti).</a:t>
-            </a:r>
-          </a:p>
-          <a:p>
-            <a:r>
-              <a:rPr lang="hr-HR" sz="1100" b="1" dirty="0"/>
-              <a:t>Klasa </a:t>
-            </a:r>
-            <a:r>
-              <a:rPr lang="hr-HR" sz="1100" b="1" dirty="0" err="1"/>
-              <a:t>Member</a:t>
-            </a:r>
-            <a:r>
-              <a:rPr lang="hr-HR" sz="1100" b="1" dirty="0"/>
-              <a:t> (Član):</a:t>
-            </a:r>
-            <a:endParaRPr lang="hr-HR" sz="1100" dirty="0"/>
-          </a:p>
-          <a:p>
-            <a:pPr lvl="1"/>
-            <a:r>
-              <a:rPr lang="hr-HR" sz="1100" dirty="0">
-                <a:solidFill>
-                  <a:schemeClr val="bg1"/>
-                </a:solidFill>
-              </a:rPr>
-              <a:t>Predstavlja člana knjižnice s atributima poput imena i jedinstvenog ID-a.</a:t>
-            </a:r>
-          </a:p>
-          <a:p>
-            <a:r>
-              <a:rPr lang="hr-HR" sz="1100" b="1" dirty="0"/>
-              <a:t>Klasa </a:t>
-            </a:r>
-            <a:r>
-              <a:rPr lang="hr-HR" sz="1100" b="1" dirty="0" err="1"/>
-              <a:t>Reservation</a:t>
-            </a:r>
-            <a:r>
-              <a:rPr lang="hr-HR" sz="1100" b="1" dirty="0"/>
-              <a:t> (Rezervacija):</a:t>
-            </a:r>
-            <a:endParaRPr lang="hr-HR" sz="1100" dirty="0"/>
-          </a:p>
-          <a:p>
-            <a:pPr marL="742950" lvl="1" indent="-285750">
-              <a:buFont typeface="+mj-lt"/>
-              <a:buAutoNum type="arabicPeriod"/>
-            </a:pPr>
-            <a:r>
-              <a:rPr lang="hr-HR" sz="1100" dirty="0">
-                <a:solidFill>
-                  <a:schemeClr val="bg1"/>
-                </a:solidFill>
-              </a:rPr>
-              <a:t>Predstavlja rezervaciju knjige od strane člana, povezujući informacije o knjizi i članu, te datum rezervacije.</a:t>
-            </a:r>
-          </a:p>
-          <a:p>
-            <a:r>
-              <a:rPr lang="hr-HR" sz="1100" b="1" dirty="0"/>
-              <a:t>Klasa </a:t>
-            </a:r>
-            <a:r>
-              <a:rPr lang="hr-HR" sz="1100" b="1" dirty="0" err="1"/>
-              <a:t>Library</a:t>
-            </a:r>
-            <a:r>
-              <a:rPr lang="hr-HR" sz="1100" b="1" dirty="0"/>
-              <a:t> (Knjižnica):</a:t>
-            </a:r>
-            <a:endParaRPr lang="hr-HR" sz="1100" dirty="0"/>
-          </a:p>
-          <a:p>
-            <a:pPr lvl="1"/>
-            <a:r>
-              <a:rPr lang="hr-HR" sz="1100" dirty="0">
-                <a:solidFill>
-                  <a:schemeClr val="bg1"/>
-                </a:solidFill>
-              </a:rPr>
-              <a:t>Sadrži kolekcije knjiga, članova i rezervacija.</a:t>
-            </a:r>
-          </a:p>
-          <a:p>
-            <a:pPr lvl="1"/>
-            <a:r>
-              <a:rPr lang="hr-HR" sz="1100" dirty="0">
-                <a:solidFill>
-                  <a:schemeClr val="bg1"/>
-                </a:solidFill>
-              </a:rPr>
-              <a:t>Omogućava interakciju između klasa, npr. dodavanje knjiga i članova, rezerviranje knjiga, ispis dostupnih knjiga i rezervacija.</a:t>
-            </a:r>
+              <a:t>https://docs.google.com/document/d/1SaCeT4RTAKUcJU7cfOFYrXhfP73OO5A3uFuGskYs-Zo/edit?usp=sharing</a:t>
+            </a:r>
+            <a:endParaRPr lang="hr-HR" sz="1100" dirty="0">
+              <a:solidFill>
+                <a:schemeClr val="bg1"/>
+              </a:solidFill>
+            </a:endParaRPr>
           </a:p>
         </p:txBody>
       </p:sp>
@@ -16157,8 +15561,8 @@
         </p:blipFill>
         <p:spPr>
           <a:xfrm>
-            <a:off x="906869" y="3258517"/>
-            <a:ext cx="5072063" cy="1698160"/>
+            <a:off x="972769" y="3413795"/>
+            <a:ext cx="6174245" cy="2067178"/>
           </a:xfrm>
           <a:prstGeom prst="rect">
             <a:avLst/>
@@ -16187,7 +15591,7 @@
         </p:blipFill>
         <p:spPr>
           <a:xfrm>
-            <a:off x="4903049" y="1377027"/>
+            <a:off x="5274625" y="1484349"/>
             <a:ext cx="3895725" cy="1190625"/>
           </a:xfrm>
           <a:prstGeom prst="rect">
@@ -16217,7 +15621,7 @@
         </p:blipFill>
         <p:spPr>
           <a:xfrm>
-            <a:off x="9013862" y="1584362"/>
+            <a:off x="9262578" y="1592645"/>
             <a:ext cx="2638425" cy="495300"/>
           </a:xfrm>
           <a:prstGeom prst="rect">
@@ -16248,7 +15652,7 @@
         <p:spPr>
           <a:xfrm>
             <a:off x="972769" y="1377027"/>
-            <a:ext cx="3576305" cy="1207926"/>
+            <a:ext cx="4209628" cy="1421836"/>
           </a:xfrm>
           <a:prstGeom prst="rect">
             <a:avLst/>
@@ -16727,8 +16131,8 @@
         </p:blipFill>
         <p:spPr>
           <a:xfrm>
-            <a:off x="6221820" y="1527998"/>
-            <a:ext cx="5679558" cy="1196871"/>
+            <a:off x="5853139" y="2132759"/>
+            <a:ext cx="6151104" cy="1296241"/>
           </a:xfrm>
           <a:prstGeom prst="rect">
             <a:avLst/>
@@ -18154,26 +17558,6 @@
 </file>
 
 <file path=customXml/item1.xml><?xml version="1.0" encoding="utf-8"?>
-<p:properties xmlns:p="http://schemas.microsoft.com/office/2006/metadata/properties" xmlns:xsi="http://www.w3.org/2001/XMLSchema-instance" xmlns:pc="http://schemas.microsoft.com/office/infopath/2007/PartnerControls">
-  <documentManagement>
-    <lcf76f155ced4ddcb4097134ff3c332f xmlns="40806f44-bc4a-4ea4-b660-c6da93f8f179">
-      <Terms xmlns="http://schemas.microsoft.com/office/infopath/2007/PartnerControls"/>
-    </lcf76f155ced4ddcb4097134ff3c332f>
-    <TaxCatchAll xmlns="758d0d8f-b783-4c78-ab73-9740c97b97cf" xsi:nil="true"/>
-  </documentManagement>
-</p:properties>
-</file>
-
-<file path=customXml/item2.xml><?xml version="1.0" encoding="utf-8"?>
-<?mso-contentType ?>
-<FormTemplates xmlns="http://schemas.microsoft.com/sharepoint/v3/contenttype/forms">
-  <Display>DocumentLibraryForm</Display>
-  <Edit>DocumentLibraryForm</Edit>
-  <New>DocumentLibraryForm</New>
-</FormTemplates>
-</file>
-
-<file path=customXml/item3.xml><?xml version="1.0" encoding="utf-8"?>
 <ct:contentTypeSchema xmlns:ct="http://schemas.microsoft.com/office/2006/metadata/contentType" xmlns:ma="http://schemas.microsoft.com/office/2006/metadata/properties/metaAttributes" ct:_="" ma:_="" ma:contentTypeName="Document" ma:contentTypeID="0x010100E4F55D9EF0BF0A44B819E681FCAC00B7" ma:contentTypeVersion="12" ma:contentTypeDescription="Create a new document." ma:contentTypeScope="" ma:versionID="068ce121a7a7a0aebcb89dd601c4f0a2">
   <xsd:schema xmlns:xsd="http://www.w3.org/2001/XMLSchema" xmlns:xs="http://www.w3.org/2001/XMLSchema" xmlns:p="http://schemas.microsoft.com/office/2006/metadata/properties" xmlns:ns2="40806f44-bc4a-4ea4-b660-c6da93f8f179" xmlns:ns3="758d0d8f-b783-4c78-ab73-9740c97b97cf" targetNamespace="http://schemas.microsoft.com/office/2006/metadata/properties" ma:root="true" ma:fieldsID="67c58e6c5c8ea9af0822acd84d25e1a2" ns2:_="" ns3:_="">
     <xsd:import namespace="40806f44-bc4a-4ea4-b660-c6da93f8f179"/>
@@ -18390,32 +17774,27 @@
 </ct:contentTypeSchema>
 </file>
 
-<file path=customXml/itemProps1.xml><?xml version="1.0" encoding="utf-8"?>
-<ds:datastoreItem xmlns:ds="http://schemas.openxmlformats.org/officeDocument/2006/customXml" ds:itemID="{61E72F81-8533-461E-8E71-A6D77294CFEF}">
-  <ds:schemaRefs>
-    <ds:schemaRef ds:uri="http://purl.org/dc/elements/1.1/"/>
-    <ds:schemaRef ds:uri="http://www.w3.org/XML/1998/namespace"/>
-    <ds:schemaRef ds:uri="http://purl.org/dc/terms/"/>
-    <ds:schemaRef ds:uri="http://schemas.microsoft.com/office/2006/documentManagement/types"/>
-    <ds:schemaRef ds:uri="40806f44-bc4a-4ea4-b660-c6da93f8f179"/>
-    <ds:schemaRef ds:uri="http://schemas.openxmlformats.org/package/2006/metadata/core-properties"/>
-    <ds:schemaRef ds:uri="http://purl.org/dc/dcmitype/"/>
-    <ds:schemaRef ds:uri="http://schemas.microsoft.com/office/infopath/2007/PartnerControls"/>
-    <ds:schemaRef ds:uri="758d0d8f-b783-4c78-ab73-9740c97b97cf"/>
-    <ds:schemaRef ds:uri="http://schemas.microsoft.com/office/2006/metadata/properties"/>
-  </ds:schemaRefs>
-</ds:datastoreItem>
+<file path=customXml/item2.xml><?xml version="1.0" encoding="utf-8"?>
+<?mso-contentType ?>
+<FormTemplates xmlns="http://schemas.microsoft.com/sharepoint/v3/contenttype/forms">
+  <Display>DocumentLibraryForm</Display>
+  <Edit>DocumentLibraryForm</Edit>
+  <New>DocumentLibraryForm</New>
+</FormTemplates>
 </file>
 
-<file path=customXml/itemProps2.xml><?xml version="1.0" encoding="utf-8"?>
-<ds:datastoreItem xmlns:ds="http://schemas.openxmlformats.org/officeDocument/2006/customXml" ds:itemID="{46915D30-CAA6-465E-907F-1770D4E3B01D}">
-  <ds:schemaRefs>
-    <ds:schemaRef ds:uri="http://schemas.microsoft.com/sharepoint/v3/contenttype/forms"/>
-  </ds:schemaRefs>
-</ds:datastoreItem>
+<file path=customXml/item3.xml><?xml version="1.0" encoding="utf-8"?>
+<p:properties xmlns:p="http://schemas.microsoft.com/office/2006/metadata/properties" xmlns:xsi="http://www.w3.org/2001/XMLSchema-instance" xmlns:pc="http://schemas.microsoft.com/office/infopath/2007/PartnerControls">
+  <documentManagement>
+    <lcf76f155ced4ddcb4097134ff3c332f xmlns="40806f44-bc4a-4ea4-b660-c6da93f8f179">
+      <Terms xmlns="http://schemas.microsoft.com/office/infopath/2007/PartnerControls"/>
+    </lcf76f155ced4ddcb4097134ff3c332f>
+    <TaxCatchAll xmlns="758d0d8f-b783-4c78-ab73-9740c97b97cf" xsi:nil="true"/>
+  </documentManagement>
+</p:properties>
 </file>
 
-<file path=customXml/itemProps3.xml><?xml version="1.0" encoding="utf-8"?>
+<file path=customXml/itemProps1.xml><?xml version="1.0" encoding="utf-8"?>
 <ds:datastoreItem xmlns:ds="http://schemas.openxmlformats.org/officeDocument/2006/customXml" ds:itemID="{4E6AED0F-96FF-4C7F-8AC9-672C91BFCDFE}">
   <ds:schemaRefs>
     <ds:schemaRef ds:uri="http://schemas.microsoft.com/office/2006/metadata/contentType"/>
@@ -18432,4 +17811,29 @@
     <ds:schemaRef ds:uri="http://schemas.microsoft.com/internal/obd"/>
   </ds:schemaRefs>
 </ds:datastoreItem>
+</file>
+
+<file path=customXml/itemProps2.xml><?xml version="1.0" encoding="utf-8"?>
+<ds:datastoreItem xmlns:ds="http://schemas.openxmlformats.org/officeDocument/2006/customXml" ds:itemID="{46915D30-CAA6-465E-907F-1770D4E3B01D}">
+  <ds:schemaRefs>
+    <ds:schemaRef ds:uri="http://schemas.microsoft.com/sharepoint/v3/contenttype/forms"/>
+  </ds:schemaRefs>
+</ds:datastoreItem>
+</file>
+
+<file path=customXml/itemProps3.xml><?xml version="1.0" encoding="utf-8"?>
+<ds:datastoreItem xmlns:ds="http://schemas.openxmlformats.org/officeDocument/2006/customXml" ds:itemID="{61E72F81-8533-461E-8E71-A6D77294CFEF}">
+  <ds:schemaRefs>
+    <ds:schemaRef ds:uri="http://purl.org/dc/elements/1.1/"/>
+    <ds:schemaRef ds:uri="http://www.w3.org/XML/1998/namespace"/>
+    <ds:schemaRef ds:uri="http://purl.org/dc/terms/"/>
+    <ds:schemaRef ds:uri="http://schemas.microsoft.com/office/2006/documentManagement/types"/>
+    <ds:schemaRef ds:uri="40806f44-bc4a-4ea4-b660-c6da93f8f179"/>
+    <ds:schemaRef ds:uri="http://schemas.openxmlformats.org/package/2006/metadata/core-properties"/>
+    <ds:schemaRef ds:uri="http://purl.org/dc/dcmitype/"/>
+    <ds:schemaRef ds:uri="http://schemas.microsoft.com/office/infopath/2007/PartnerControls"/>
+    <ds:schemaRef ds:uri="758d0d8f-b783-4c78-ab73-9740c97b97cf"/>
+    <ds:schemaRef ds:uri="http://schemas.microsoft.com/office/2006/metadata/properties"/>
+  </ds:schemaRefs>
+</ds:datastoreItem>
 </file>
</xml_diff>